<commit_message>
Preparação do powerpoint para a apresentação
</commit_message>
<xml_diff>
--- a/doc/Desenvolvimento de Aplicações (Projeto Fase 1).pptx
+++ b/doc/Desenvolvimento de Aplicações (Projeto Fase 1).pptx
@@ -130,6 +130,50 @@
     </p:ext>
   </p:extLst>
 </p:presentation>
+</file>
+
+<file path=ppt/changesInfos/changesInfo1.xml><?xml version="1.0" encoding="utf-8"?>
+<pc:chgInfo xmlns:a="http://schemas.openxmlformats.org/drawingml/2006/main" xmlns:r="http://schemas.openxmlformats.org/officeDocument/2006/relationships" xmlns:ac="http://schemas.microsoft.com/office/drawing/2013/main/command" xmlns:pc="http://schemas.microsoft.com/office/powerpoint/2013/main/command">
+  <pc:docChgLst>
+    <pc:chgData name="Gonçalo Ferreira" userId="6d43f7fc6fabef3b" providerId="LiveId" clId="{A1B0DF47-5CDA-4CD5-A240-246D7C5F194F}"/>
+    <pc:docChg chg="modSld">
+      <pc:chgData name="Gonçalo Ferreira" userId="6d43f7fc6fabef3b" providerId="LiveId" clId="{A1B0DF47-5CDA-4CD5-A240-246D7C5F194F}" dt="2021-06-11T10:33:56.565" v="25" actId="20577"/>
+      <pc:docMkLst>
+        <pc:docMk/>
+      </pc:docMkLst>
+      <pc:sldChg chg="modSp mod">
+        <pc:chgData name="Gonçalo Ferreira" userId="6d43f7fc6fabef3b" providerId="LiveId" clId="{A1B0DF47-5CDA-4CD5-A240-246D7C5F194F}" dt="2021-06-11T10:33:37.635" v="1" actId="1076"/>
+        <pc:sldMkLst>
+          <pc:docMk/>
+          <pc:sldMk cId="45043390" sldId="260"/>
+        </pc:sldMkLst>
+        <pc:picChg chg="mod">
+          <ac:chgData name="Gonçalo Ferreira" userId="6d43f7fc6fabef3b" providerId="LiveId" clId="{A1B0DF47-5CDA-4CD5-A240-246D7C5F194F}" dt="2021-06-11T10:33:37.635" v="1" actId="1076"/>
+          <ac:picMkLst>
+            <pc:docMk/>
+            <pc:sldMk cId="45043390" sldId="260"/>
+            <ac:picMk id="6" creationId="{A0B16325-3013-4561-B69E-9208FF7E90C8}"/>
+          </ac:picMkLst>
+        </pc:picChg>
+      </pc:sldChg>
+      <pc:sldChg chg="modSp mod">
+        <pc:chgData name="Gonçalo Ferreira" userId="6d43f7fc6fabef3b" providerId="LiveId" clId="{A1B0DF47-5CDA-4CD5-A240-246D7C5F194F}" dt="2021-06-11T10:33:56.565" v="25" actId="20577"/>
+        <pc:sldMkLst>
+          <pc:docMk/>
+          <pc:sldMk cId="3053863990" sldId="262"/>
+        </pc:sldMkLst>
+        <pc:spChg chg="mod">
+          <ac:chgData name="Gonçalo Ferreira" userId="6d43f7fc6fabef3b" providerId="LiveId" clId="{A1B0DF47-5CDA-4CD5-A240-246D7C5F194F}" dt="2021-06-11T10:33:56.565" v="25" actId="20577"/>
+          <ac:spMkLst>
+            <pc:docMk/>
+            <pc:sldMk cId="3053863990" sldId="262"/>
+            <ac:spMk id="2" creationId="{9BB93350-6844-4AEA-8C6B-9FAB08B8C192}"/>
+          </ac:spMkLst>
+        </pc:spChg>
+      </pc:sldChg>
+    </pc:docChg>
+  </pc:docChgLst>
+</pc:chgInfo>
 </file>
 
 <file path=ppt/diagrams/colors1.xml><?xml version="1.0" encoding="utf-8"?>
@@ -3878,7 +3922,7 @@
             <a:pPr rtl="0"/>
             <a:fld id="{C8CB2839-1C58-4BCF-A979-9A1F76285043}" type="datetime1">
               <a:rPr lang="pt-PT" smtClean="0"/>
-              <a:t>18/05/2021</a:t>
+              <a:t>11/06/2021</a:t>
             </a:fld>
             <a:endParaRPr lang="en-US" dirty="0"/>
           </a:p>
@@ -4048,7 +4092,7 @@
             <a:pPr rtl="0"/>
             <a:fld id="{DEB0334B-A01B-4ED9-84B2-4047E9C40D52}" type="datetime1">
               <a:rPr lang="pt-PT" smtClean="0"/>
-              <a:t>18/05/2021</a:t>
+              <a:t>11/06/2021</a:t>
             </a:fld>
             <a:endParaRPr lang="en-US"/>
           </a:p>
@@ -4562,7 +4606,7 @@
             <a:pPr rtl="0"/>
             <a:fld id="{133C872B-9021-4EB5-978D-88549561B1BF}" type="datetime1">
               <a:rPr lang="pt-PT" smtClean="0"/>
-              <a:t>18/05/2021</a:t>
+              <a:t>11/06/2021</a:t>
             </a:fld>
             <a:endParaRPr lang="en-US" dirty="0"/>
           </a:p>
@@ -4769,7 +4813,7 @@
             <a:pPr rtl="0"/>
             <a:fld id="{D596A2F7-C4B5-4B27-A004-0671785D38D6}" type="datetime1">
               <a:rPr lang="pt-PT" smtClean="0"/>
-              <a:t>18/05/2021</a:t>
+              <a:t>11/06/2021</a:t>
             </a:fld>
             <a:endParaRPr lang="en-US" dirty="0"/>
           </a:p>
@@ -5135,7 +5179,7 @@
             <a:pPr rtl="0"/>
             <a:fld id="{1F6322EC-603C-467A-ABE0-DDADD4D3F055}" type="datetime1">
               <a:rPr lang="pt-PT" smtClean="0"/>
-              <a:t>18/05/2021</a:t>
+              <a:t>11/06/2021</a:t>
             </a:fld>
             <a:endParaRPr lang="en-US" dirty="0"/>
           </a:p>
@@ -5337,7 +5381,7 @@
             <a:pPr rtl="0"/>
             <a:fld id="{9E09E755-EDBC-4192-AC9E-FCC227FEE010}" type="datetime1">
               <a:rPr lang="pt-PT" smtClean="0"/>
-              <a:t>18/05/2021</a:t>
+              <a:t>11/06/2021</a:t>
             </a:fld>
             <a:endParaRPr lang="en-US" dirty="0"/>
           </a:p>
@@ -5653,7 +5697,7 @@
             <a:pPr rtl="0"/>
             <a:fld id="{5D96CFE7-A573-4719-8192-DEF0EFA75C09}" type="datetime1">
               <a:rPr lang="pt-PT" smtClean="0"/>
-              <a:t>18/05/2021</a:t>
+              <a:t>11/06/2021</a:t>
             </a:fld>
             <a:endParaRPr lang="en-US" dirty="0"/>
           </a:p>
@@ -5910,7 +5954,7 @@
             <a:pPr rtl="0"/>
             <a:fld id="{20897C99-EC67-49CE-86D9-F22CCAECAE5E}" type="datetime1">
               <a:rPr lang="pt-PT" smtClean="0"/>
-              <a:t>18/05/2021</a:t>
+              <a:t>11/06/2021</a:t>
             </a:fld>
             <a:endParaRPr lang="en-US" dirty="0"/>
           </a:p>
@@ -6344,7 +6388,7 @@
             <a:pPr rtl="0"/>
             <a:fld id="{BE14A099-40C0-42BE-A240-B8755EA7A0CD}" type="datetime1">
               <a:rPr lang="pt-PT" smtClean="0"/>
-              <a:t>18/05/2021</a:t>
+              <a:t>11/06/2021</a:t>
             </a:fld>
             <a:endParaRPr lang="en-US" dirty="0"/>
           </a:p>
@@ -6471,7 +6515,7 @@
             <a:pPr rtl="0"/>
             <a:fld id="{51700D0E-9E8B-4A9D-866D-52C1587B5C4A}" type="datetime1">
               <a:rPr lang="pt-PT" smtClean="0"/>
-              <a:t>18/05/2021</a:t>
+              <a:t>11/06/2021</a:t>
             </a:fld>
             <a:endParaRPr lang="en-US" dirty="0"/>
           </a:p>
@@ -6569,7 +6613,7 @@
             <a:pPr rtl="0"/>
             <a:fld id="{FB469DDE-4AA9-46B4-8B4B-ABB43359B0EE}" type="datetime1">
               <a:rPr lang="pt-PT" smtClean="0"/>
-              <a:t>18/05/2021</a:t>
+              <a:t>11/06/2021</a:t>
             </a:fld>
             <a:endParaRPr lang="en-US" dirty="0"/>
           </a:p>
@@ -6950,7 +6994,7 @@
             <a:pPr rtl="0"/>
             <a:fld id="{EBD87A0C-49D4-4622-B87D-BA2C1B765D76}" type="datetime1">
               <a:rPr lang="pt-PT" smtClean="0"/>
-              <a:t>18/05/2021</a:t>
+              <a:t>11/06/2021</a:t>
             </a:fld>
             <a:endParaRPr lang="en-US" dirty="0"/>
           </a:p>
@@ -7248,7 +7292,7 @@
             <a:pPr rtl="0"/>
             <a:fld id="{E99E4EDA-B394-40D1-A4AB-5A278200C327}" type="datetime1">
               <a:rPr lang="pt-PT" smtClean="0"/>
-              <a:t>18/05/2021</a:t>
+              <a:t>11/06/2021</a:t>
             </a:fld>
             <a:endParaRPr lang="en-US" dirty="0"/>
           </a:p>
@@ -7466,7 +7510,7 @@
             <a:pPr rtl="0"/>
             <a:fld id="{0B0569AC-F3A4-423E-A7DC-09E1643F31E7}" type="datetime1">
               <a:rPr lang="pt-PT" smtClean="0"/>
-              <a:t>18/05/2021</a:t>
+              <a:t>11/06/2021</a:t>
             </a:fld>
             <a:endParaRPr lang="en-US" dirty="0"/>
           </a:p>
@@ -8577,7 +8621,7 @@
             <a:pPr rtl="0"/>
             <a:fld id="{9E09E755-EDBC-4192-AC9E-FCC227FEE010}" type="datetime1">
               <a:rPr lang="pt-PT" smtClean="0"/>
-              <a:t>18/05/2021</a:t>
+              <a:t>11/06/2021</a:t>
             </a:fld>
             <a:endParaRPr lang="en-US" dirty="0"/>
           </a:p>
@@ -8780,7 +8824,7 @@
             <a:pPr rtl="0"/>
             <a:fld id="{9E09E755-EDBC-4192-AC9E-FCC227FEE010}" type="datetime1">
               <a:rPr lang="pt-PT" smtClean="0"/>
-              <a:t>18/05/2021</a:t>
+              <a:t>11/06/2021</a:t>
             </a:fld>
             <a:endParaRPr lang="en-US" dirty="0"/>
           </a:p>
@@ -8893,8 +8937,13 @@
           <a:p>
             <a:r>
               <a:rPr lang="pt-PT" dirty="0"/>
-              <a:t>Execução do Projeto</a:t>
+              <a:t>Apresentação do Projeto </a:t>
             </a:r>
+            <a:r>
+              <a:rPr lang="pt-PT"/>
+              <a:t>Em execução</a:t>
+            </a:r>
+            <a:endParaRPr lang="pt-PT" dirty="0"/>
           </a:p>
         </p:txBody>
       </p:sp>
@@ -8935,15 +8984,6 @@
           <a:solidFill>
             <a:srgbClr val="FFFFFF"/>
           </a:solidFill>
-          <a:extLst>
-            <a:ext uri="{909E8E84-426E-40DD-AFC4-6F175D3DCCD1}">
-              <a14:hiddenFill xmlns:a14="http://schemas.microsoft.com/office/drawing/2010/main">
-                <a:solidFill>
-                  <a:srgbClr val="FFFFFF"/>
-                </a:solidFill>
-              </a14:hiddenFill>
-            </a:ext>
-          </a:extLst>
         </p:spPr>
       </p:pic>
       <p:sp>
@@ -8986,7 +9026,7 @@
                   <a:spcPts val="600"/>
                 </a:spcAft>
               </a:pPr>
-              <a:t>18/05/2021</a:t>
+              <a:t>11/06/2021</a:t>
             </a:fld>
             <a:endParaRPr lang="en-US"/>
           </a:p>
@@ -9230,7 +9270,7 @@
             <a:pPr rtl="0"/>
             <a:fld id="{9E09E755-EDBC-4192-AC9E-FCC227FEE010}" type="datetime1">
               <a:rPr lang="pt-PT" smtClean="0"/>
-              <a:t>18/05/2021</a:t>
+              <a:t>11/06/2021</a:t>
             </a:fld>
             <a:endParaRPr lang="en-US" dirty="0"/>
           </a:p>
@@ -9303,7 +9343,7 @@
         </p:blipFill>
         <p:spPr>
           <a:xfrm>
-            <a:off x="886293" y="1352634"/>
+            <a:off x="886293" y="1140945"/>
             <a:ext cx="3099218" cy="2014404"/>
           </a:xfrm>
           <a:prstGeom prst="rect">
@@ -9493,7 +9533,7 @@
             <a:pPr rtl="0"/>
             <a:fld id="{9E09E755-EDBC-4192-AC9E-FCC227FEE010}" type="datetime1">
               <a:rPr lang="pt-PT" smtClean="0"/>
-              <a:t>18/05/2021</a:t>
+              <a:t>11/06/2021</a:t>
             </a:fld>
             <a:endParaRPr lang="en-US" dirty="0"/>
           </a:p>
@@ -9675,7 +9715,7 @@
             <a:pPr rtl="0"/>
             <a:fld id="{9E09E755-EDBC-4192-AC9E-FCC227FEE010}" type="datetime1">
               <a:rPr lang="pt-PT" smtClean="0"/>
-              <a:t>18/05/2021</a:t>
+              <a:t>11/06/2021</a:t>
             </a:fld>
             <a:endParaRPr lang="en-US" dirty="0"/>
           </a:p>
@@ -9843,7 +9883,7 @@
             <a:pPr rtl="0"/>
             <a:fld id="{9E09E755-EDBC-4192-AC9E-FCC227FEE010}" type="datetime1">
               <a:rPr lang="pt-PT" smtClean="0"/>
-              <a:t>18/05/2021</a:t>
+              <a:t>11/06/2021</a:t>
             </a:fld>
             <a:endParaRPr lang="en-US" dirty="0"/>
           </a:p>
@@ -10011,7 +10051,7 @@
             <a:pPr rtl="0"/>
             <a:fld id="{9E09E755-EDBC-4192-AC9E-FCC227FEE010}" type="datetime1">
               <a:rPr lang="pt-PT" smtClean="0"/>
-              <a:t>18/05/2021</a:t>
+              <a:t>11/06/2021</a:t>
             </a:fld>
             <a:endParaRPr lang="en-US" dirty="0"/>
           </a:p>
@@ -10179,7 +10219,7 @@
             <a:pPr rtl="0"/>
             <a:fld id="{9E09E755-EDBC-4192-AC9E-FCC227FEE010}" type="datetime1">
               <a:rPr lang="pt-PT" smtClean="0"/>
-              <a:t>18/05/2021</a:t>
+              <a:t>11/06/2021</a:t>
             </a:fld>
             <a:endParaRPr lang="en-US" dirty="0"/>
           </a:p>
@@ -10346,7 +10386,7 @@
             <a:pPr rtl="0"/>
             <a:fld id="{9E09E755-EDBC-4192-AC9E-FCC227FEE010}" type="datetime1">
               <a:rPr lang="pt-PT" smtClean="0"/>
-              <a:t>18/05/2021</a:t>
+              <a:t>11/06/2021</a:t>
             </a:fld>
             <a:endParaRPr lang="en-US" dirty="0"/>
           </a:p>

</xml_diff>